<commit_message>
Updated module one notebook all material included
</commit_message>
<xml_diff>
--- a/session1_getting_started/intro_to_python_class_1.pptx
+++ b/session1_getting_started/intro_to_python_class_1.pptx
@@ -5,10 +5,10 @@
     <p:sldMasterId id="2147483648" r:id="rId1"/>
   </p:sldMasterIdLst>
   <p:notesMasterIdLst>
-    <p:notesMasterId r:id="rId14"/>
+    <p:notesMasterId r:id="rId10"/>
   </p:notesMasterIdLst>
   <p:handoutMasterIdLst>
-    <p:handoutMasterId r:id="rId15"/>
+    <p:handoutMasterId r:id="rId11"/>
   </p:handoutMasterIdLst>
   <p:sldIdLst>
     <p:sldId id="256" r:id="rId2"/>
@@ -17,12 +17,8 @@
     <p:sldId id="266" r:id="rId5"/>
     <p:sldId id="267" r:id="rId6"/>
     <p:sldId id="269" r:id="rId7"/>
-    <p:sldId id="270" r:id="rId8"/>
-    <p:sldId id="271" r:id="rId9"/>
-    <p:sldId id="272" r:id="rId10"/>
-    <p:sldId id="273" r:id="rId11"/>
-    <p:sldId id="274" r:id="rId12"/>
-    <p:sldId id="275" r:id="rId13"/>
+    <p:sldId id="277" r:id="rId8"/>
+    <p:sldId id="278" r:id="rId9"/>
   </p:sldIdLst>
   <p:sldSz cx="12192000" cy="6858000"/>
   <p:notesSz cx="6858000" cy="9144000"/>
@@ -225,7 +221,7 @@
           <a:p>
             <a:fld id="{762B48F5-BACC-47D6-A0F7-82FBF9C6BC85}" type="datetimeFigureOut">
               <a:rPr lang="en-US"/>
-              <a:t>9/27/2018</a:t>
+              <a:t>10/16/2018</a:t>
             </a:fld>
             <a:endParaRPr/>
           </a:p>
@@ -390,7 +386,7 @@
           <a:p>
             <a:fld id="{0CB1CD00-5424-4675-AB18-2C419B060449}" type="datetimeFigureOut">
               <a:rPr lang="en-US"/>
-              <a:t>9/27/2018</a:t>
+              <a:t>10/16/2018</a:t>
             </a:fld>
             <a:endParaRPr/>
           </a:p>
@@ -736,174 +732,6 @@
 </p:notes>
 </file>
 
-<file path=ppt/notesSlides/notesSlide10.xml><?xml version="1.0" encoding="utf-8"?>
-<p:notes xmlns:a="http://schemas.openxmlformats.org/drawingml/2006/main" xmlns:r="http://schemas.openxmlformats.org/officeDocument/2006/relationships" xmlns:p="http://schemas.openxmlformats.org/presentationml/2006/main">
-  <p:cSld>
-    <p:spTree>
-      <p:nvGrpSpPr>
-        <p:cNvPr id="1" name=""/>
-        <p:cNvGrpSpPr/>
-        <p:nvPr/>
-      </p:nvGrpSpPr>
-      <p:grpSpPr>
-        <a:xfrm>
-          <a:off x="0" y="0"/>
-          <a:ext cx="0" cy="0"/>
-          <a:chOff x="0" y="0"/>
-          <a:chExt cx="0" cy="0"/>
-        </a:xfrm>
-      </p:grpSpPr>
-      <p:sp>
-        <p:nvSpPr>
-          <p:cNvPr id="2" name="Slide Image Placeholder 1"/>
-          <p:cNvSpPr>
-            <a:spLocks noGrp="1" noRot="1" noChangeAspect="1"/>
-          </p:cNvSpPr>
-          <p:nvPr>
-            <p:ph type="sldImg"/>
-          </p:nvPr>
-        </p:nvSpPr>
-        <p:spPr/>
-      </p:sp>
-      <p:sp>
-        <p:nvSpPr>
-          <p:cNvPr id="3" name="Notes Placeholder 2"/>
-          <p:cNvSpPr>
-            <a:spLocks noGrp="1"/>
-          </p:cNvSpPr>
-          <p:nvPr>
-            <p:ph type="body" idx="1"/>
-          </p:nvPr>
-        </p:nvSpPr>
-        <p:spPr/>
-        <p:txBody>
-          <a:bodyPr/>
-          <a:lstStyle/>
-          <a:p>
-            <a:endParaRPr lang="en-US"/>
-          </a:p>
-        </p:txBody>
-      </p:sp>
-      <p:sp>
-        <p:nvSpPr>
-          <p:cNvPr id="4" name="Slide Number Placeholder 3"/>
-          <p:cNvSpPr>
-            <a:spLocks noGrp="1"/>
-          </p:cNvSpPr>
-          <p:nvPr>
-            <p:ph type="sldNum" sz="quarter" idx="10"/>
-          </p:nvPr>
-        </p:nvSpPr>
-        <p:spPr/>
-        <p:txBody>
-          <a:bodyPr/>
-          <a:lstStyle/>
-          <a:p>
-            <a:fld id="{5EE2CF44-2B13-41B4-A334-1CDF534EEBBF}" type="slidenum">
-              <a:rPr lang="en-US"/>
-              <a:t>11</a:t>
-            </a:fld>
-            <a:endParaRPr lang="en-US"/>
-          </a:p>
-        </p:txBody>
-      </p:sp>
-    </p:spTree>
-    <p:extLst>
-      <p:ext uri="{BB962C8B-B14F-4D97-AF65-F5344CB8AC3E}">
-        <p14:creationId xmlns:p14="http://schemas.microsoft.com/office/powerpoint/2010/main" val="1219887576"/>
-      </p:ext>
-    </p:extLst>
-  </p:cSld>
-  <p:clrMapOvr>
-    <a:masterClrMapping/>
-  </p:clrMapOvr>
-</p:notes>
-</file>
-
-<file path=ppt/notesSlides/notesSlide11.xml><?xml version="1.0" encoding="utf-8"?>
-<p:notes xmlns:a="http://schemas.openxmlformats.org/drawingml/2006/main" xmlns:r="http://schemas.openxmlformats.org/officeDocument/2006/relationships" xmlns:p="http://schemas.openxmlformats.org/presentationml/2006/main">
-  <p:cSld>
-    <p:spTree>
-      <p:nvGrpSpPr>
-        <p:cNvPr id="1" name=""/>
-        <p:cNvGrpSpPr/>
-        <p:nvPr/>
-      </p:nvGrpSpPr>
-      <p:grpSpPr>
-        <a:xfrm>
-          <a:off x="0" y="0"/>
-          <a:ext cx="0" cy="0"/>
-          <a:chOff x="0" y="0"/>
-          <a:chExt cx="0" cy="0"/>
-        </a:xfrm>
-      </p:grpSpPr>
-      <p:sp>
-        <p:nvSpPr>
-          <p:cNvPr id="2" name="Slide Image Placeholder 1"/>
-          <p:cNvSpPr>
-            <a:spLocks noGrp="1" noRot="1" noChangeAspect="1"/>
-          </p:cNvSpPr>
-          <p:nvPr>
-            <p:ph type="sldImg"/>
-          </p:nvPr>
-        </p:nvSpPr>
-        <p:spPr/>
-      </p:sp>
-      <p:sp>
-        <p:nvSpPr>
-          <p:cNvPr id="3" name="Notes Placeholder 2"/>
-          <p:cNvSpPr>
-            <a:spLocks noGrp="1"/>
-          </p:cNvSpPr>
-          <p:nvPr>
-            <p:ph type="body" idx="1"/>
-          </p:nvPr>
-        </p:nvSpPr>
-        <p:spPr/>
-        <p:txBody>
-          <a:bodyPr/>
-          <a:lstStyle/>
-          <a:p>
-            <a:endParaRPr lang="en-US"/>
-          </a:p>
-        </p:txBody>
-      </p:sp>
-      <p:sp>
-        <p:nvSpPr>
-          <p:cNvPr id="4" name="Slide Number Placeholder 3"/>
-          <p:cNvSpPr>
-            <a:spLocks noGrp="1"/>
-          </p:cNvSpPr>
-          <p:nvPr>
-            <p:ph type="sldNum" sz="quarter" idx="10"/>
-          </p:nvPr>
-        </p:nvSpPr>
-        <p:spPr/>
-        <p:txBody>
-          <a:bodyPr/>
-          <a:lstStyle/>
-          <a:p>
-            <a:fld id="{5EE2CF44-2B13-41B4-A334-1CDF534EEBBF}" type="slidenum">
-              <a:rPr lang="en-US"/>
-              <a:t>12</a:t>
-            </a:fld>
-            <a:endParaRPr lang="en-US"/>
-          </a:p>
-        </p:txBody>
-      </p:sp>
-    </p:spTree>
-    <p:extLst>
-      <p:ext uri="{BB962C8B-B14F-4D97-AF65-F5344CB8AC3E}">
-        <p14:creationId xmlns:p14="http://schemas.microsoft.com/office/powerpoint/2010/main" val="2198812866"/>
-      </p:ext>
-    </p:extLst>
-  </p:cSld>
-  <p:clrMapOvr>
-    <a:masterClrMapping/>
-  </p:clrMapOvr>
-</p:notes>
-</file>
-
 <file path=ppt/notesSlides/notesSlide2.xml><?xml version="1.0" encoding="utf-8"?>
 <p:notes xmlns:a="http://schemas.openxmlformats.org/drawingml/2006/main" xmlns:r="http://schemas.openxmlformats.org/officeDocument/2006/relationships" xmlns:p="http://schemas.openxmlformats.org/presentationml/2006/main">
   <p:cSld>
@@ -1314,259 +1142,7 @@
     </p:spTree>
     <p:extLst>
       <p:ext uri="{BB962C8B-B14F-4D97-AF65-F5344CB8AC3E}">
-        <p14:creationId xmlns:p14="http://schemas.microsoft.com/office/powerpoint/2010/main" val="4126098401"/>
-      </p:ext>
-    </p:extLst>
-  </p:cSld>
-  <p:clrMapOvr>
-    <a:masterClrMapping/>
-  </p:clrMapOvr>
-</p:notes>
-</file>
-
-<file path=ppt/notesSlides/notesSlide7.xml><?xml version="1.0" encoding="utf-8"?>
-<p:notes xmlns:a="http://schemas.openxmlformats.org/drawingml/2006/main" xmlns:r="http://schemas.openxmlformats.org/officeDocument/2006/relationships" xmlns:p="http://schemas.openxmlformats.org/presentationml/2006/main">
-  <p:cSld>
-    <p:spTree>
-      <p:nvGrpSpPr>
-        <p:cNvPr id="1" name=""/>
-        <p:cNvGrpSpPr/>
-        <p:nvPr/>
-      </p:nvGrpSpPr>
-      <p:grpSpPr>
-        <a:xfrm>
-          <a:off x="0" y="0"/>
-          <a:ext cx="0" cy="0"/>
-          <a:chOff x="0" y="0"/>
-          <a:chExt cx="0" cy="0"/>
-        </a:xfrm>
-      </p:grpSpPr>
-      <p:sp>
-        <p:nvSpPr>
-          <p:cNvPr id="2" name="Slide Image Placeholder 1"/>
-          <p:cNvSpPr>
-            <a:spLocks noGrp="1" noRot="1" noChangeAspect="1"/>
-          </p:cNvSpPr>
-          <p:nvPr>
-            <p:ph type="sldImg"/>
-          </p:nvPr>
-        </p:nvSpPr>
-        <p:spPr/>
-      </p:sp>
-      <p:sp>
-        <p:nvSpPr>
-          <p:cNvPr id="3" name="Notes Placeholder 2"/>
-          <p:cNvSpPr>
-            <a:spLocks noGrp="1"/>
-          </p:cNvSpPr>
-          <p:nvPr>
-            <p:ph type="body" idx="1"/>
-          </p:nvPr>
-        </p:nvSpPr>
-        <p:spPr/>
-        <p:txBody>
-          <a:bodyPr/>
-          <a:lstStyle/>
-          <a:p>
-            <a:endParaRPr lang="en-US"/>
-          </a:p>
-        </p:txBody>
-      </p:sp>
-      <p:sp>
-        <p:nvSpPr>
-          <p:cNvPr id="4" name="Slide Number Placeholder 3"/>
-          <p:cNvSpPr>
-            <a:spLocks noGrp="1"/>
-          </p:cNvSpPr>
-          <p:nvPr>
-            <p:ph type="sldNum" sz="quarter" idx="10"/>
-          </p:nvPr>
-        </p:nvSpPr>
-        <p:spPr/>
-        <p:txBody>
-          <a:bodyPr/>
-          <a:lstStyle/>
-          <a:p>
-            <a:fld id="{5EE2CF44-2B13-41B4-A334-1CDF534EEBBF}" type="slidenum">
-              <a:rPr lang="en-US"/>
-              <a:t>8</a:t>
-            </a:fld>
-            <a:endParaRPr lang="en-US"/>
-          </a:p>
-        </p:txBody>
-      </p:sp>
-    </p:spTree>
-    <p:extLst>
-      <p:ext uri="{BB962C8B-B14F-4D97-AF65-F5344CB8AC3E}">
-        <p14:creationId xmlns:p14="http://schemas.microsoft.com/office/powerpoint/2010/main" val="1034530990"/>
-      </p:ext>
-    </p:extLst>
-  </p:cSld>
-  <p:clrMapOvr>
-    <a:masterClrMapping/>
-  </p:clrMapOvr>
-</p:notes>
-</file>
-
-<file path=ppt/notesSlides/notesSlide8.xml><?xml version="1.0" encoding="utf-8"?>
-<p:notes xmlns:a="http://schemas.openxmlformats.org/drawingml/2006/main" xmlns:r="http://schemas.openxmlformats.org/officeDocument/2006/relationships" xmlns:p="http://schemas.openxmlformats.org/presentationml/2006/main">
-  <p:cSld>
-    <p:spTree>
-      <p:nvGrpSpPr>
-        <p:cNvPr id="1" name=""/>
-        <p:cNvGrpSpPr/>
-        <p:nvPr/>
-      </p:nvGrpSpPr>
-      <p:grpSpPr>
-        <a:xfrm>
-          <a:off x="0" y="0"/>
-          <a:ext cx="0" cy="0"/>
-          <a:chOff x="0" y="0"/>
-          <a:chExt cx="0" cy="0"/>
-        </a:xfrm>
-      </p:grpSpPr>
-      <p:sp>
-        <p:nvSpPr>
-          <p:cNvPr id="2" name="Slide Image Placeholder 1"/>
-          <p:cNvSpPr>
-            <a:spLocks noGrp="1" noRot="1" noChangeAspect="1"/>
-          </p:cNvSpPr>
-          <p:nvPr>
-            <p:ph type="sldImg"/>
-          </p:nvPr>
-        </p:nvSpPr>
-        <p:spPr/>
-      </p:sp>
-      <p:sp>
-        <p:nvSpPr>
-          <p:cNvPr id="3" name="Notes Placeholder 2"/>
-          <p:cNvSpPr>
-            <a:spLocks noGrp="1"/>
-          </p:cNvSpPr>
-          <p:nvPr>
-            <p:ph type="body" idx="1"/>
-          </p:nvPr>
-        </p:nvSpPr>
-        <p:spPr/>
-        <p:txBody>
-          <a:bodyPr/>
-          <a:lstStyle/>
-          <a:p>
-            <a:endParaRPr lang="en-US"/>
-          </a:p>
-        </p:txBody>
-      </p:sp>
-      <p:sp>
-        <p:nvSpPr>
-          <p:cNvPr id="4" name="Slide Number Placeholder 3"/>
-          <p:cNvSpPr>
-            <a:spLocks noGrp="1"/>
-          </p:cNvSpPr>
-          <p:nvPr>
-            <p:ph type="sldNum" sz="quarter" idx="10"/>
-          </p:nvPr>
-        </p:nvSpPr>
-        <p:spPr/>
-        <p:txBody>
-          <a:bodyPr/>
-          <a:lstStyle/>
-          <a:p>
-            <a:fld id="{5EE2CF44-2B13-41B4-A334-1CDF534EEBBF}" type="slidenum">
-              <a:rPr lang="en-US"/>
-              <a:t>9</a:t>
-            </a:fld>
-            <a:endParaRPr lang="en-US"/>
-          </a:p>
-        </p:txBody>
-      </p:sp>
-    </p:spTree>
-    <p:extLst>
-      <p:ext uri="{BB962C8B-B14F-4D97-AF65-F5344CB8AC3E}">
-        <p14:creationId xmlns:p14="http://schemas.microsoft.com/office/powerpoint/2010/main" val="133870359"/>
-      </p:ext>
-    </p:extLst>
-  </p:cSld>
-  <p:clrMapOvr>
-    <a:masterClrMapping/>
-  </p:clrMapOvr>
-</p:notes>
-</file>
-
-<file path=ppt/notesSlides/notesSlide9.xml><?xml version="1.0" encoding="utf-8"?>
-<p:notes xmlns:a="http://schemas.openxmlformats.org/drawingml/2006/main" xmlns:r="http://schemas.openxmlformats.org/officeDocument/2006/relationships" xmlns:p="http://schemas.openxmlformats.org/presentationml/2006/main">
-  <p:cSld>
-    <p:spTree>
-      <p:nvGrpSpPr>
-        <p:cNvPr id="1" name=""/>
-        <p:cNvGrpSpPr/>
-        <p:nvPr/>
-      </p:nvGrpSpPr>
-      <p:grpSpPr>
-        <a:xfrm>
-          <a:off x="0" y="0"/>
-          <a:ext cx="0" cy="0"/>
-          <a:chOff x="0" y="0"/>
-          <a:chExt cx="0" cy="0"/>
-        </a:xfrm>
-      </p:grpSpPr>
-      <p:sp>
-        <p:nvSpPr>
-          <p:cNvPr id="2" name="Slide Image Placeholder 1"/>
-          <p:cNvSpPr>
-            <a:spLocks noGrp="1" noRot="1" noChangeAspect="1"/>
-          </p:cNvSpPr>
-          <p:nvPr>
-            <p:ph type="sldImg"/>
-          </p:nvPr>
-        </p:nvSpPr>
-        <p:spPr/>
-      </p:sp>
-      <p:sp>
-        <p:nvSpPr>
-          <p:cNvPr id="3" name="Notes Placeholder 2"/>
-          <p:cNvSpPr>
-            <a:spLocks noGrp="1"/>
-          </p:cNvSpPr>
-          <p:nvPr>
-            <p:ph type="body" idx="1"/>
-          </p:nvPr>
-        </p:nvSpPr>
-        <p:spPr/>
-        <p:txBody>
-          <a:bodyPr/>
-          <a:lstStyle/>
-          <a:p>
-            <a:endParaRPr lang="en-US"/>
-          </a:p>
-        </p:txBody>
-      </p:sp>
-      <p:sp>
-        <p:nvSpPr>
-          <p:cNvPr id="4" name="Slide Number Placeholder 3"/>
-          <p:cNvSpPr>
-            <a:spLocks noGrp="1"/>
-          </p:cNvSpPr>
-          <p:nvPr>
-            <p:ph type="sldNum" sz="quarter" idx="10"/>
-          </p:nvPr>
-        </p:nvSpPr>
-        <p:spPr/>
-        <p:txBody>
-          <a:bodyPr/>
-          <a:lstStyle/>
-          <a:p>
-            <a:fld id="{5EE2CF44-2B13-41B4-A334-1CDF534EEBBF}" type="slidenum">
-              <a:rPr lang="en-US"/>
-              <a:t>10</a:t>
-            </a:fld>
-            <a:endParaRPr lang="en-US"/>
-          </a:p>
-        </p:txBody>
-      </p:sp>
-    </p:spTree>
-    <p:extLst>
-      <p:ext uri="{BB962C8B-B14F-4D97-AF65-F5344CB8AC3E}">
-        <p14:creationId xmlns:p14="http://schemas.microsoft.com/office/powerpoint/2010/main" val="974072586"/>
+        <p14:creationId xmlns:p14="http://schemas.microsoft.com/office/powerpoint/2010/main" val="2905275258"/>
       </p:ext>
     </p:extLst>
   </p:cSld>
@@ -1949,7 +1525,7 @@
           <a:p>
             <a:fld id="{37CC0096-1860-4642-9CD2-0079EA5E7CD1}" type="datetimeFigureOut">
               <a:rPr lang="en-US" smtClean="0"/>
-              <a:t>9/27/2018</a:t>
+              <a:t>10/16/2018</a:t>
             </a:fld>
             <a:endParaRPr lang="en-US"/>
           </a:p>
@@ -2139,7 +1715,7 @@
           <a:p>
             <a:fld id="{37CC0096-1860-4642-9CD2-0079EA5E7CD1}" type="datetimeFigureOut">
               <a:rPr lang="en-US" smtClean="0"/>
-              <a:t>9/27/2018</a:t>
+              <a:t>10/16/2018</a:t>
             </a:fld>
             <a:endParaRPr lang="en-US"/>
           </a:p>
@@ -2323,7 +1899,7 @@
           <a:p>
             <a:fld id="{37CC0096-1860-4642-9CD2-0079EA5E7CD1}" type="datetimeFigureOut">
               <a:rPr lang="en-US" smtClean="0"/>
-              <a:t>9/27/2018</a:t>
+              <a:t>10/16/2018</a:t>
             </a:fld>
             <a:endParaRPr lang="en-US"/>
           </a:p>
@@ -2778,7 +2354,7 @@
           <a:p>
             <a:fld id="{37CC0096-1860-4642-9CD2-0079EA5E7CD1}" type="datetimeFigureOut">
               <a:rPr lang="en-US" smtClean="0"/>
-              <a:t>9/27/2018</a:t>
+              <a:t>10/16/2018</a:t>
             </a:fld>
             <a:endParaRPr lang="en-US"/>
           </a:p>
@@ -3227,7 +2803,7 @@
           <a:p>
             <a:fld id="{37CC0096-1860-4642-9CD2-0079EA5E7CD1}" type="datetimeFigureOut">
               <a:rPr lang="en-US" smtClean="0"/>
-              <a:t>9/27/2018</a:t>
+              <a:t>10/16/2018</a:t>
             </a:fld>
             <a:endParaRPr lang="en-US"/>
           </a:p>
@@ -3356,7 +2932,7 @@
           <a:p>
             <a:fld id="{37CC0096-1860-4642-9CD2-0079EA5E7CD1}" type="datetimeFigureOut">
               <a:rPr lang="en-US" smtClean="0"/>
-              <a:t>9/27/2018</a:t>
+              <a:t>10/16/2018</a:t>
             </a:fld>
             <a:endParaRPr lang="en-US"/>
           </a:p>
@@ -3463,7 +3039,7 @@
           <a:p>
             <a:fld id="{37CC0096-1860-4642-9CD2-0079EA5E7CD1}" type="datetimeFigureOut">
               <a:rPr lang="en-US" smtClean="0"/>
-              <a:t>9/27/2018</a:t>
+              <a:t>10/16/2018</a:t>
             </a:fld>
             <a:endParaRPr lang="en-US"/>
           </a:p>
@@ -3757,7 +3333,7 @@
           <a:p>
             <a:fld id="{37CC0096-1860-4642-9CD2-0079EA5E7CD1}" type="datetimeFigureOut">
               <a:rPr lang="en-US" smtClean="0"/>
-              <a:t>9/27/2018</a:t>
+              <a:t>10/16/2018</a:t>
             </a:fld>
             <a:endParaRPr lang="en-US"/>
           </a:p>
@@ -4080,7 +3656,7 @@
           <a:p>
             <a:fld id="{37CC0096-1860-4642-9CD2-0079EA5E7CD1}" type="datetimeFigureOut">
               <a:rPr lang="en-US" smtClean="0"/>
-              <a:t>9/27/2018</a:t>
+              <a:t>10/16/2018</a:t>
             </a:fld>
             <a:endParaRPr lang="en-US"/>
           </a:p>
@@ -4298,7 +3874,7 @@
             <a:fld id="{37CC0096-1860-4642-9CD2-0079EA5E7CD1}" type="datetimeFigureOut">
               <a:rPr lang="en-US"/>
               <a:pPr/>
-              <a:t>9/27/2018</a:t>
+              <a:t>10/16/2018</a:t>
             </a:fld>
             <a:endParaRPr/>
           </a:p>
@@ -4866,239 +4442,6 @@
     <p:extLst>
       <p:ext uri="{BB962C8B-B14F-4D97-AF65-F5344CB8AC3E}">
         <p14:creationId xmlns:p14="http://schemas.microsoft.com/office/powerpoint/2010/main" val="242453831"/>
-      </p:ext>
-    </p:extLst>
-  </p:cSld>
-  <p:clrMapOvr>
-    <a:masterClrMapping/>
-  </p:clrMapOvr>
-  <mc:AlternateContent xmlns:mc="http://schemas.openxmlformats.org/markup-compatibility/2006" xmlns:p14="http://schemas.microsoft.com/office/powerpoint/2010/main">
-    <mc:Choice Requires="p14">
-      <p:transition spd="med" p14:dur="700">
-        <p:fade/>
-      </p:transition>
-    </mc:Choice>
-    <mc:Fallback xmlns="">
-      <p:transition spd="med">
-        <p:fade/>
-      </p:transition>
-    </mc:Fallback>
-  </mc:AlternateContent>
-</p:sld>
-</file>
-
-<file path=ppt/slides/slide10.xml><?xml version="1.0" encoding="utf-8"?>
-<p:sld xmlns:a="http://schemas.openxmlformats.org/drawingml/2006/main" xmlns:r="http://schemas.openxmlformats.org/officeDocument/2006/relationships" xmlns:p="http://schemas.openxmlformats.org/presentationml/2006/main">
-  <p:cSld>
-    <p:spTree>
-      <p:nvGrpSpPr>
-        <p:cNvPr id="1" name=""/>
-        <p:cNvGrpSpPr/>
-        <p:nvPr/>
-      </p:nvGrpSpPr>
-      <p:grpSpPr>
-        <a:xfrm>
-          <a:off x="0" y="0"/>
-          <a:ext cx="0" cy="0"/>
-          <a:chOff x="0" y="0"/>
-          <a:chExt cx="0" cy="0"/>
-        </a:xfrm>
-      </p:grpSpPr>
-    </p:spTree>
-    <p:extLst>
-      <p:ext uri="{BB962C8B-B14F-4D97-AF65-F5344CB8AC3E}">
-        <p14:creationId xmlns:p14="http://schemas.microsoft.com/office/powerpoint/2010/main" val="3661180859"/>
-      </p:ext>
-    </p:extLst>
-  </p:cSld>
-  <p:clrMapOvr>
-    <a:masterClrMapping/>
-  </p:clrMapOvr>
-  <mc:AlternateContent xmlns:mc="http://schemas.openxmlformats.org/markup-compatibility/2006" xmlns:p14="http://schemas.microsoft.com/office/powerpoint/2010/main">
-    <mc:Choice Requires="p14">
-      <p:transition spd="med" p14:dur="700">
-        <p:fade/>
-      </p:transition>
-    </mc:Choice>
-    <mc:Fallback xmlns="">
-      <p:transition spd="med">
-        <p:fade/>
-      </p:transition>
-    </mc:Fallback>
-  </mc:AlternateContent>
-</p:sld>
-</file>
-
-<file path=ppt/slides/slide11.xml><?xml version="1.0" encoding="utf-8"?>
-<p:sld xmlns:a="http://schemas.openxmlformats.org/drawingml/2006/main" xmlns:r="http://schemas.openxmlformats.org/officeDocument/2006/relationships" xmlns:p="http://schemas.openxmlformats.org/presentationml/2006/main">
-  <p:cSld>
-    <p:spTree>
-      <p:nvGrpSpPr>
-        <p:cNvPr id="1" name=""/>
-        <p:cNvGrpSpPr/>
-        <p:nvPr/>
-      </p:nvGrpSpPr>
-      <p:grpSpPr>
-        <a:xfrm>
-          <a:off x="0" y="0"/>
-          <a:ext cx="0" cy="0"/>
-          <a:chOff x="0" y="0"/>
-          <a:chExt cx="0" cy="0"/>
-        </a:xfrm>
-      </p:grpSpPr>
-      <p:sp>
-        <p:nvSpPr>
-          <p:cNvPr id="2" name="Title 1"/>
-          <p:cNvSpPr>
-            <a:spLocks noGrp="1"/>
-          </p:cNvSpPr>
-          <p:nvPr>
-            <p:ph type="title"/>
-          </p:nvPr>
-        </p:nvSpPr>
-        <p:spPr/>
-        <p:txBody>
-          <a:bodyPr/>
-          <a:lstStyle/>
-          <a:p>
-            <a:endParaRPr/>
-          </a:p>
-        </p:txBody>
-      </p:sp>
-      <p:sp>
-        <p:nvSpPr>
-          <p:cNvPr id="3" name="Content Placeholder 2"/>
-          <p:cNvSpPr>
-            <a:spLocks noGrp="1"/>
-          </p:cNvSpPr>
-          <p:nvPr>
-            <p:ph idx="1"/>
-          </p:nvPr>
-        </p:nvSpPr>
-        <p:spPr/>
-        <p:txBody>
-          <a:bodyPr/>
-          <a:lstStyle/>
-          <a:p>
-            <a:endParaRPr/>
-          </a:p>
-        </p:txBody>
-      </p:sp>
-      <p:sp>
-        <p:nvSpPr>
-          <p:cNvPr id="4" name="Text Placeholder 3"/>
-          <p:cNvSpPr>
-            <a:spLocks noGrp="1"/>
-          </p:cNvSpPr>
-          <p:nvPr>
-            <p:ph type="body" sz="half" idx="2"/>
-          </p:nvPr>
-        </p:nvSpPr>
-        <p:spPr/>
-        <p:txBody>
-          <a:bodyPr/>
-          <a:lstStyle/>
-          <a:p>
-            <a:endParaRPr/>
-          </a:p>
-        </p:txBody>
-      </p:sp>
-    </p:spTree>
-    <p:extLst>
-      <p:ext uri="{BB962C8B-B14F-4D97-AF65-F5344CB8AC3E}">
-        <p14:creationId xmlns:p14="http://schemas.microsoft.com/office/powerpoint/2010/main" val="3232560146"/>
-      </p:ext>
-    </p:extLst>
-  </p:cSld>
-  <p:clrMapOvr>
-    <a:masterClrMapping/>
-  </p:clrMapOvr>
-  <mc:AlternateContent xmlns:mc="http://schemas.openxmlformats.org/markup-compatibility/2006" xmlns:p14="http://schemas.microsoft.com/office/powerpoint/2010/main">
-    <mc:Choice Requires="p14">
-      <p:transition spd="med" p14:dur="700">
-        <p:fade/>
-      </p:transition>
-    </mc:Choice>
-    <mc:Fallback xmlns="">
-      <p:transition spd="med">
-        <p:fade/>
-      </p:transition>
-    </mc:Fallback>
-  </mc:AlternateContent>
-</p:sld>
-</file>
-
-<file path=ppt/slides/slide12.xml><?xml version="1.0" encoding="utf-8"?>
-<p:sld xmlns:a="http://schemas.openxmlformats.org/drawingml/2006/main" xmlns:r="http://schemas.openxmlformats.org/officeDocument/2006/relationships" xmlns:p="http://schemas.openxmlformats.org/presentationml/2006/main">
-  <p:cSld>
-    <p:spTree>
-      <p:nvGrpSpPr>
-        <p:cNvPr id="1" name=""/>
-        <p:cNvGrpSpPr/>
-        <p:nvPr/>
-      </p:nvGrpSpPr>
-      <p:grpSpPr>
-        <a:xfrm>
-          <a:off x="0" y="0"/>
-          <a:ext cx="0" cy="0"/>
-          <a:chOff x="0" y="0"/>
-          <a:chExt cx="0" cy="0"/>
-        </a:xfrm>
-      </p:grpSpPr>
-      <p:sp>
-        <p:nvSpPr>
-          <p:cNvPr id="2" name="Title 1"/>
-          <p:cNvSpPr>
-            <a:spLocks noGrp="1"/>
-          </p:cNvSpPr>
-          <p:nvPr>
-            <p:ph type="title"/>
-          </p:nvPr>
-        </p:nvSpPr>
-        <p:spPr/>
-        <p:txBody>
-          <a:bodyPr/>
-          <a:lstStyle/>
-          <a:p>
-            <a:endParaRPr/>
-          </a:p>
-        </p:txBody>
-      </p:sp>
-      <p:sp>
-        <p:nvSpPr>
-          <p:cNvPr id="3" name="Picture Placeholder 2"/>
-          <p:cNvSpPr>
-            <a:spLocks noGrp="1"/>
-          </p:cNvSpPr>
-          <p:nvPr>
-            <p:ph type="pic" idx="1"/>
-          </p:nvPr>
-        </p:nvSpPr>
-        <p:spPr/>
-      </p:sp>
-      <p:sp>
-        <p:nvSpPr>
-          <p:cNvPr id="4" name="Text Placeholder 3"/>
-          <p:cNvSpPr>
-            <a:spLocks noGrp="1"/>
-          </p:cNvSpPr>
-          <p:nvPr>
-            <p:ph type="body" sz="half" idx="2"/>
-          </p:nvPr>
-        </p:nvSpPr>
-        <p:spPr/>
-        <p:txBody>
-          <a:bodyPr/>
-          <a:lstStyle/>
-          <a:p>
-            <a:endParaRPr/>
-          </a:p>
-        </p:txBody>
-      </p:sp>
-    </p:spTree>
-    <p:extLst>
-      <p:ext uri="{BB962C8B-B14F-4D97-AF65-F5344CB8AC3E}">
-        <p14:creationId xmlns:p14="http://schemas.microsoft.com/office/powerpoint/2010/main" val="1857640680"/>
       </p:ext>
     </p:extLst>
   </p:cSld>
@@ -7344,7 +6687,17 @@
             </a:pPr>
             <a:r>
               <a:rPr lang="en-IE" dirty="0"/>
-              <a:t>[Insert more information here]</a:t>
+              <a:t>Large community, enhanced support</a:t>
+            </a:r>
+          </a:p>
+          <a:p>
+            <a:pPr marL="285750" indent="-285750">
+              <a:buFont typeface="Arial" panose="020B0604020202020204" pitchFamily="34" charset="0"/>
+              <a:buChar char="•"/>
+            </a:pPr>
+            <a:r>
+              <a:rPr lang="en-IE" dirty="0"/>
+              <a:t>Huge amount of open source libraries, frameworks etc.</a:t>
             </a:r>
           </a:p>
         </p:txBody>
@@ -7381,10 +6734,22 @@
             <a:off x="284996" y="301178"/>
             <a:ext cx="7295356" cy="6255644"/>
           </a:xfrm>
-          <a:prstGeom prst="rect">
-            <a:avLst/>
+          <a:prstGeom prst="roundRect">
+            <a:avLst>
+              <a:gd name="adj" fmla="val 8594"/>
+            </a:avLst>
           </a:prstGeom>
-          <a:noFill/>
+          <a:solidFill>
+            <a:srgbClr val="FFFFFF">
+              <a:shade val="85000"/>
+            </a:srgbClr>
+          </a:solidFill>
+          <a:ln>
+            <a:noFill/>
+          </a:ln>
+          <a:effectLst>
+            <a:reflection blurRad="12700" stA="38000" endPos="28000" dist="5000" dir="5400000" sy="-100000" algn="bl" rotWithShape="0"/>
+          </a:effectLst>
           <a:extLst>
             <a:ext uri="{909E8E84-426E-40DD-AFC4-6F175D3DCCD1}">
               <a14:hiddenFill xmlns:a14="http://schemas.microsoft.com/office/drawing/2010/main">
@@ -7518,33 +6883,18 @@
           <a:bodyPr/>
           <a:lstStyle/>
           <a:p>
-            <a:endParaRPr/>
-          </a:p>
-        </p:txBody>
-      </p:sp>
-      <p:sp>
-        <p:nvSpPr>
-          <p:cNvPr id="3" name="Text Placeholder 2"/>
-          <p:cNvSpPr>
-            <a:spLocks noGrp="1"/>
-          </p:cNvSpPr>
-          <p:nvPr>
-            <p:ph type="body" idx="1"/>
-          </p:nvPr>
-        </p:nvSpPr>
-        <p:spPr/>
-        <p:txBody>
-          <a:bodyPr/>
-          <a:lstStyle/>
-          <a:p>
-            <a:endParaRPr/>
+            <a:r>
+              <a:rPr lang="en-IE" dirty="0"/>
+              <a:t>Where is it Being Used?</a:t>
+            </a:r>
+            <a:endParaRPr dirty="0"/>
           </a:p>
         </p:txBody>
       </p:sp>
     </p:spTree>
     <p:extLst>
       <p:ext uri="{BB962C8B-B14F-4D97-AF65-F5344CB8AC3E}">
-        <p14:creationId xmlns:p14="http://schemas.microsoft.com/office/powerpoint/2010/main" val="3444435236"/>
+        <p14:creationId xmlns:p14="http://schemas.microsoft.com/office/powerpoint/2010/main" val="3159996699"/>
       </p:ext>
     </p:extLst>
   </p:cSld>
@@ -7585,7 +6935,13 @@
       </p:grpSpPr>
       <p:sp>
         <p:nvSpPr>
-          <p:cNvPr id="2" name="Title 1"/>
+          <p:cNvPr id="2" name="Title 1">
+            <a:extLst>
+              <a:ext uri="{FF2B5EF4-FFF2-40B4-BE49-F238E27FC236}">
+                <a16:creationId xmlns:a16="http://schemas.microsoft.com/office/drawing/2014/main" id="{28EF4B99-F12F-40DB-AF82-D3E73F2E9D8C}"/>
+              </a:ext>
+            </a:extLst>
+          </p:cNvPr>
           <p:cNvSpPr>
             <a:spLocks noGrp="1"/>
           </p:cNvSpPr>
@@ -7598,18 +6954,27 @@
           <a:bodyPr/>
           <a:lstStyle/>
           <a:p>
-            <a:endParaRPr/>
-          </a:p>
-        </p:txBody>
-      </p:sp>
-      <p:sp>
-        <p:nvSpPr>
-          <p:cNvPr id="3" name="Text Placeholder 2"/>
-          <p:cNvSpPr>
-            <a:spLocks noGrp="1"/>
-          </p:cNvSpPr>
-          <p:nvPr>
-            <p:ph type="body" idx="1"/>
+            <a:r>
+              <a:rPr lang="en-IE" dirty="0"/>
+              <a:t>First Steps with Python</a:t>
+            </a:r>
+          </a:p>
+        </p:txBody>
+      </p:sp>
+      <p:sp>
+        <p:nvSpPr>
+          <p:cNvPr id="3" name="Content Placeholder 2">
+            <a:extLst>
+              <a:ext uri="{FF2B5EF4-FFF2-40B4-BE49-F238E27FC236}">
+                <a16:creationId xmlns:a16="http://schemas.microsoft.com/office/drawing/2014/main" id="{177DCB77-7D3A-4AB0-949B-47968A6E6F65}"/>
+              </a:ext>
+            </a:extLst>
+          </p:cNvPr>
+          <p:cNvSpPr>
+            <a:spLocks noGrp="1"/>
+          </p:cNvSpPr>
+          <p:nvPr>
+            <p:ph idx="1"/>
           </p:nvPr>
         </p:nvSpPr>
         <p:spPr/>
@@ -7617,132 +6982,90 @@
           <a:bodyPr/>
           <a:lstStyle/>
           <a:p>
-            <a:endParaRPr/>
-          </a:p>
-        </p:txBody>
-      </p:sp>
-      <p:sp>
-        <p:nvSpPr>
-          <p:cNvPr id="4" name="Content Placeholder 3"/>
-          <p:cNvSpPr>
-            <a:spLocks noGrp="1"/>
-          </p:cNvSpPr>
-          <p:nvPr>
-            <p:ph sz="half" idx="2"/>
-          </p:nvPr>
-        </p:nvSpPr>
-        <p:spPr/>
-        <p:txBody>
-          <a:bodyPr/>
-          <a:lstStyle/>
-          <a:p>
-            <a:endParaRPr/>
-          </a:p>
-        </p:txBody>
-      </p:sp>
-      <p:sp>
-        <p:nvSpPr>
-          <p:cNvPr id="5" name="Text Placeholder 4"/>
-          <p:cNvSpPr>
-            <a:spLocks noGrp="1"/>
-          </p:cNvSpPr>
-          <p:nvPr>
-            <p:ph type="body" sz="quarter" idx="3"/>
-          </p:nvPr>
-        </p:nvSpPr>
-        <p:spPr/>
-        <p:txBody>
-          <a:bodyPr/>
-          <a:lstStyle/>
-          <a:p>
-            <a:endParaRPr/>
-          </a:p>
-        </p:txBody>
-      </p:sp>
-      <p:sp>
-        <p:nvSpPr>
-          <p:cNvPr id="6" name="Content Placeholder 5"/>
-          <p:cNvSpPr>
-            <a:spLocks noGrp="1"/>
-          </p:cNvSpPr>
-          <p:nvPr>
-            <p:ph sz="quarter" idx="4"/>
-          </p:nvPr>
-        </p:nvSpPr>
-        <p:spPr/>
-        <p:txBody>
-          <a:bodyPr/>
-          <a:lstStyle/>
-          <a:p>
-            <a:endParaRPr/>
+            <a:r>
+              <a:rPr lang="en-IE" dirty="0"/>
+              <a:t>Basics</a:t>
+            </a:r>
+          </a:p>
+          <a:p>
+            <a:pPr lvl="1"/>
+            <a:r>
+              <a:rPr lang="en-IE" dirty="0"/>
+              <a:t>Python.org </a:t>
+            </a:r>
+          </a:p>
+          <a:p>
+            <a:pPr lvl="2"/>
+            <a:r>
+              <a:rPr lang="en-IE" dirty="0"/>
+              <a:t>About</a:t>
+            </a:r>
+          </a:p>
+          <a:p>
+            <a:pPr lvl="2"/>
+            <a:r>
+              <a:rPr lang="en-IE" dirty="0"/>
+              <a:t>Download &amp; install</a:t>
+            </a:r>
+          </a:p>
+          <a:p>
+            <a:pPr lvl="2"/>
+            <a:r>
+              <a:rPr lang="en-IE" dirty="0"/>
+              <a:t>Documentation</a:t>
+            </a:r>
+          </a:p>
+          <a:p>
+            <a:pPr lvl="2"/>
+            <a:r>
+              <a:rPr lang="en-IE" dirty="0"/>
+              <a:t>Community</a:t>
+            </a:r>
+          </a:p>
+          <a:p>
+            <a:pPr lvl="1"/>
+            <a:r>
+              <a:rPr lang="en-IE" dirty="0"/>
+              <a:t>Installing</a:t>
+            </a:r>
+          </a:p>
+          <a:p>
+            <a:r>
+              <a:rPr lang="en-IE" dirty="0"/>
+              <a:t>Working with Others Code</a:t>
+            </a:r>
+          </a:p>
+          <a:p>
+            <a:pPr lvl="1"/>
+            <a:r>
+              <a:rPr lang="en-IE" dirty="0" err="1"/>
+              <a:t>PyPi</a:t>
+            </a:r>
+            <a:r>
+              <a:rPr lang="en-IE" dirty="0"/>
+              <a:t> – Python Packages index</a:t>
+            </a:r>
+          </a:p>
+          <a:p>
+            <a:pPr lvl="1"/>
+            <a:r>
+              <a:rPr lang="en-IE" dirty="0"/>
+              <a:t>Using PIP </a:t>
+            </a:r>
+          </a:p>
+          <a:p>
+            <a:endParaRPr lang="en-IE" dirty="0"/>
+          </a:p>
+          <a:p>
+            <a:pPr lvl="1"/>
+            <a:endParaRPr lang="en-IE" dirty="0"/>
           </a:p>
         </p:txBody>
       </p:sp>
     </p:spTree>
     <p:extLst>
       <p:ext uri="{BB962C8B-B14F-4D97-AF65-F5344CB8AC3E}">
-        <p14:creationId xmlns:p14="http://schemas.microsoft.com/office/powerpoint/2010/main" val="1475842300"/>
-      </p:ext>
-    </p:extLst>
-  </p:cSld>
-  <p:clrMapOvr>
-    <a:masterClrMapping/>
-  </p:clrMapOvr>
-  <mc:AlternateContent xmlns:mc="http://schemas.openxmlformats.org/markup-compatibility/2006" xmlns:p14="http://schemas.microsoft.com/office/powerpoint/2010/main">
-    <mc:Choice Requires="p14">
-      <p:transition spd="med" p14:dur="700">
-        <p:fade/>
-      </p:transition>
-    </mc:Choice>
-    <mc:Fallback xmlns="">
-      <p:transition spd="med">
-        <p:fade/>
-      </p:transition>
-    </mc:Fallback>
-  </mc:AlternateContent>
-</p:sld>
-</file>
-
-<file path=ppt/slides/slide9.xml><?xml version="1.0" encoding="utf-8"?>
-<p:sld xmlns:a="http://schemas.openxmlformats.org/drawingml/2006/main" xmlns:r="http://schemas.openxmlformats.org/officeDocument/2006/relationships" xmlns:p="http://schemas.openxmlformats.org/presentationml/2006/main">
-  <p:cSld>
-    <p:spTree>
-      <p:nvGrpSpPr>
-        <p:cNvPr id="1" name=""/>
-        <p:cNvGrpSpPr/>
-        <p:nvPr/>
-      </p:nvGrpSpPr>
-      <p:grpSpPr>
-        <a:xfrm>
-          <a:off x="0" y="0"/>
-          <a:ext cx="0" cy="0"/>
-          <a:chOff x="0" y="0"/>
-          <a:chExt cx="0" cy="0"/>
-        </a:xfrm>
-      </p:grpSpPr>
-      <p:sp>
-        <p:nvSpPr>
-          <p:cNvPr id="2" name="Title 1"/>
-          <p:cNvSpPr>
-            <a:spLocks noGrp="1"/>
-          </p:cNvSpPr>
-          <p:nvPr>
-            <p:ph type="title"/>
-          </p:nvPr>
-        </p:nvSpPr>
-        <p:spPr/>
-        <p:txBody>
-          <a:bodyPr/>
-          <a:lstStyle/>
-          <a:p>
-            <a:endParaRPr/>
-          </a:p>
-        </p:txBody>
-      </p:sp>
-    </p:spTree>
-    <p:extLst>
-      <p:ext uri="{BB962C8B-B14F-4D97-AF65-F5344CB8AC3E}">
-        <p14:creationId xmlns:p14="http://schemas.microsoft.com/office/powerpoint/2010/main" val="215988672"/>
+        <p14:creationId xmlns:p14="http://schemas.microsoft.com/office/powerpoint/2010/main" val="567861677"/>
       </p:ext>
     </p:extLst>
   </p:cSld>

</xml_diff>